<commit_message>
Added charts to ppt
</commit_message>
<xml_diff>
--- a/docs/speaking-3/speaking3.pptx
+++ b/docs/speaking-3/speaking3.pptx
@@ -117,6 +117,11 @@
       </a:defRPr>
     </a:lvl9pPr>
   </p:defaultTextStyle>
+  <p:extLst>
+    <p:ext uri="{EFAFB233-063F-42B5-8137-9DF3F51BA10A}">
+      <p15:sldGuideLst xmlns:p15="http://schemas.microsoft.com/office/powerpoint/2012/main"/>
+    </p:ext>
+  </p:extLst>
 </p:presentation>
 </file>
 
@@ -5415,25 +5420,35 @@
           </a:p>
         </p:txBody>
       </p:sp>
-      <p:sp>
-        <p:nvSpPr>
-          <p:cNvPr id="3" name="Content Placeholder 2"/>
-          <p:cNvSpPr>
-            <a:spLocks noGrp="1"/>
-          </p:cNvSpPr>
+      <p:pic>
+        <p:nvPicPr>
+          <p:cNvPr id="5" name="Content Placeholder 4"/>
+          <p:cNvPicPr>
+            <a:picLocks noGrp="1" noChangeAspect="1"/>
+          </p:cNvPicPr>
           <p:nvPr>
             <p:ph idx="1"/>
           </p:nvPr>
-        </p:nvSpPr>
-        <p:spPr/>
-        <p:txBody>
-          <a:bodyPr/>
-          <a:lstStyle/>
-          <a:p>
-            <a:endParaRPr lang="en-US" dirty="0"/>
-          </a:p>
-        </p:txBody>
-      </p:sp>
+        </p:nvPicPr>
+        <p:blipFill>
+          <a:blip r:embed="rId2">
+            <a:extLst>
+              <a:ext uri="{28A0092B-C50C-407E-A947-70E740481C1C}">
+                <a14:useLocalDpi xmlns:a14="http://schemas.microsoft.com/office/drawing/2010/main" val="0"/>
+              </a:ext>
+            </a:extLst>
+          </a:blip>
+          <a:stretch>
+            <a:fillRect/>
+          </a:stretch>
+        </p:blipFill>
+        <p:spPr>
+          <a:xfrm>
+            <a:off x="822325" y="2432685"/>
+            <a:ext cx="7543800" cy="2849880"/>
+          </a:xfrm>
+        </p:spPr>
+      </p:pic>
       <p:sp>
         <p:nvSpPr>
           <p:cNvPr id="4" name="TextBox 3"/>
@@ -5552,25 +5567,35 @@
           </a:p>
         </p:txBody>
       </p:sp>
-      <p:sp>
-        <p:nvSpPr>
-          <p:cNvPr id="3" name="Content Placeholder 2"/>
-          <p:cNvSpPr>
-            <a:spLocks noGrp="1"/>
-          </p:cNvSpPr>
+      <p:pic>
+        <p:nvPicPr>
+          <p:cNvPr id="5" name="Content Placeholder 4"/>
+          <p:cNvPicPr>
+            <a:picLocks noGrp="1" noChangeAspect="1"/>
+          </p:cNvPicPr>
           <p:nvPr>
             <p:ph idx="1"/>
           </p:nvPr>
-        </p:nvSpPr>
-        <p:spPr/>
-        <p:txBody>
-          <a:bodyPr/>
-          <a:lstStyle/>
-          <a:p>
-            <a:endParaRPr lang="en-US"/>
-          </a:p>
-        </p:txBody>
-      </p:sp>
+        </p:nvPicPr>
+        <p:blipFill>
+          <a:blip r:embed="rId2">
+            <a:extLst>
+              <a:ext uri="{28A0092B-C50C-407E-A947-70E740481C1C}">
+                <a14:useLocalDpi xmlns:a14="http://schemas.microsoft.com/office/drawing/2010/main" val="0"/>
+              </a:ext>
+            </a:extLst>
+          </a:blip>
+          <a:stretch>
+            <a:fillRect/>
+          </a:stretch>
+        </p:blipFill>
+        <p:spPr>
+          <a:xfrm>
+            <a:off x="1040182" y="2779324"/>
+            <a:ext cx="7109355" cy="1920240"/>
+          </a:xfrm>
+        </p:spPr>
+      </p:pic>
       <p:sp>
         <p:nvSpPr>
           <p:cNvPr id="4" name="TextBox 3"/>

</xml_diff>